<commit_message>
Day 13 - pizza menu setup added
</commit_message>
<xml_diff>
--- a/Day 1/Day 1 - Course Overview.pptx
+++ b/Day 1/Day 1 - Course Overview.pptx
@@ -215,7 +215,7 @@
           <a:p>
             <a:fld id="{0C596001-DCD7-B941-B7B7-335C0C37BE8D}" type="datetimeFigureOut">
               <a:rPr lang="en-US" smtClean="0"/>
-              <a:t>12/1/24</a:t>
+              <a:t>12/15/24</a:t>
             </a:fld>
             <a:endParaRPr lang="en-US"/>
           </a:p>
@@ -893,7 +893,7 @@
           <a:p>
             <a:fld id="{D29F4D1E-2136-1242-9FBF-7C2FA9BCF4E2}" type="datetimeFigureOut">
               <a:rPr lang="en-US" smtClean="0"/>
-              <a:t>12/1/24</a:t>
+              <a:t>12/15/24</a:t>
             </a:fld>
             <a:endParaRPr lang="en-US"/>
           </a:p>
@@ -1131,7 +1131,7 @@
           <a:p>
             <a:fld id="{D29F4D1E-2136-1242-9FBF-7C2FA9BCF4E2}" type="datetimeFigureOut">
               <a:rPr lang="en-US" smtClean="0"/>
-              <a:t>12/1/24</a:t>
+              <a:t>12/15/24</a:t>
             </a:fld>
             <a:endParaRPr lang="en-US"/>
           </a:p>
@@ -1970,7 +1970,7 @@
           <a:p>
             <a:fld id="{D29F4D1E-2136-1242-9FBF-7C2FA9BCF4E2}" type="datetimeFigureOut">
               <a:rPr lang="en-US" smtClean="0"/>
-              <a:t>12/1/24</a:t>
+              <a:t>12/15/24</a:t>
             </a:fld>
             <a:endParaRPr lang="en-US"/>
           </a:p>
@@ -2421,7 +2421,7 @@
           <a:p>
             <a:fld id="{D29F4D1E-2136-1242-9FBF-7C2FA9BCF4E2}" type="datetimeFigureOut">
               <a:rPr lang="en-US" smtClean="0"/>
-              <a:t>12/1/24</a:t>
+              <a:t>12/15/24</a:t>
             </a:fld>
             <a:endParaRPr lang="en-US"/>
           </a:p>
@@ -2594,7 +2594,7 @@
           <a:p>
             <a:fld id="{D29F4D1E-2136-1242-9FBF-7C2FA9BCF4E2}" type="datetimeFigureOut">
               <a:rPr lang="en-US" smtClean="0"/>
-              <a:t>12/1/24</a:t>
+              <a:t>12/15/24</a:t>
             </a:fld>
             <a:endParaRPr lang="en-US"/>
           </a:p>
@@ -2731,7 +2731,7 @@
           <a:p>
             <a:fld id="{D29F4D1E-2136-1242-9FBF-7C2FA9BCF4E2}" type="datetimeFigureOut">
               <a:rPr lang="en-US" smtClean="0"/>
-              <a:t>12/1/24</a:t>
+              <a:t>12/15/24</a:t>
             </a:fld>
             <a:endParaRPr lang="en-US"/>
           </a:p>
@@ -3075,7 +3075,7 @@
           <a:p>
             <a:fld id="{D29F4D1E-2136-1242-9FBF-7C2FA9BCF4E2}" type="datetimeFigureOut">
               <a:rPr lang="en-US" smtClean="0"/>
-              <a:t>12/1/24</a:t>
+              <a:t>12/15/24</a:t>
             </a:fld>
             <a:endParaRPr lang="en-US"/>
           </a:p>
@@ -3396,7 +3396,7 @@
           <a:p>
             <a:fld id="{D29F4D1E-2136-1242-9FBF-7C2FA9BCF4E2}" type="datetimeFigureOut">
               <a:rPr lang="en-US" smtClean="0"/>
-              <a:t>12/1/24</a:t>
+              <a:t>12/15/24</a:t>
             </a:fld>
             <a:endParaRPr lang="en-US"/>
           </a:p>
@@ -7839,6 +7839,38 @@
           </a:p>
         </p:txBody>
       </p:sp>
+      <p:sp>
+        <p:nvSpPr>
+          <p:cNvPr id="2" name="TextBox 1">
+            <a:extLst>
+              <a:ext uri="{FF2B5EF4-FFF2-40B4-BE49-F238E27FC236}">
+                <a16:creationId xmlns:a16="http://schemas.microsoft.com/office/drawing/2014/main" id="{07C9664F-7DD7-90BD-4B49-22D4E9DD128C}"/>
+              </a:ext>
+            </a:extLst>
+          </p:cNvPr>
+          <p:cNvSpPr txBox="1"/>
+          <p:nvPr/>
+        </p:nvSpPr>
+        <p:spPr>
+          <a:xfrm>
+            <a:off x="8797491" y="4697128"/>
+            <a:ext cx="184731" cy="369332"/>
+          </a:xfrm>
+          <a:prstGeom prst="rect">
+            <a:avLst/>
+          </a:prstGeom>
+          <a:noFill/>
+        </p:spPr>
+        <p:txBody>
+          <a:bodyPr wrap="none" rtlCol="0">
+            <a:spAutoFit/>
+          </a:bodyPr>
+          <a:lstStyle/>
+          <a:p>
+            <a:endParaRPr lang="en-US"/>
+          </a:p>
+        </p:txBody>
+      </p:sp>
     </p:spTree>
     <p:extLst>
       <p:ext uri="{BB962C8B-B14F-4D97-AF65-F5344CB8AC3E}">

</xml_diff>